<commit_message>
changed presentation cz project was reworked
</commit_message>
<xml_diff>
--- a/diplomPresentation.pptx
+++ b/diplomPresentation.pptx
@@ -329,7 +329,7 @@
             <a:fld id="{1D8BD707-D9CF-40AE-B4C6-C98DA3205C09}" type="datetimeFigureOut">
               <a:rPr lang="en-US" smtClean="0"/>
               <a:pPr/>
-              <a:t>3/28/2024</a:t>
+              <a:t>3/30/2024</a:t>
             </a:fld>
             <a:endParaRPr lang="en-US"/>
           </a:p>
@@ -494,7 +494,7 @@
             <a:fld id="{1D8BD707-D9CF-40AE-B4C6-C98DA3205C09}" type="datetimeFigureOut">
               <a:rPr lang="en-US" smtClean="0"/>
               <a:pPr/>
-              <a:t>3/28/2024</a:t>
+              <a:t>3/30/2024</a:t>
             </a:fld>
             <a:endParaRPr lang="en-US"/>
           </a:p>
@@ -669,7 +669,7 @@
             <a:fld id="{1D8BD707-D9CF-40AE-B4C6-C98DA3205C09}" type="datetimeFigureOut">
               <a:rPr lang="en-US" smtClean="0"/>
               <a:pPr/>
-              <a:t>3/28/2024</a:t>
+              <a:t>3/30/2024</a:t>
             </a:fld>
             <a:endParaRPr lang="en-US"/>
           </a:p>
@@ -834,7 +834,7 @@
             <a:fld id="{1D8BD707-D9CF-40AE-B4C6-C98DA3205C09}" type="datetimeFigureOut">
               <a:rPr lang="en-US" smtClean="0"/>
               <a:pPr/>
-              <a:t>3/28/2024</a:t>
+              <a:t>3/30/2024</a:t>
             </a:fld>
             <a:endParaRPr lang="en-US"/>
           </a:p>
@@ -1076,7 +1076,7 @@
             <a:fld id="{1D8BD707-D9CF-40AE-B4C6-C98DA3205C09}" type="datetimeFigureOut">
               <a:rPr lang="en-US" smtClean="0"/>
               <a:pPr/>
-              <a:t>3/28/2024</a:t>
+              <a:t>3/30/2024</a:t>
             </a:fld>
             <a:endParaRPr lang="en-US"/>
           </a:p>
@@ -1358,7 +1358,7 @@
             <a:fld id="{1D8BD707-D9CF-40AE-B4C6-C98DA3205C09}" type="datetimeFigureOut">
               <a:rPr lang="en-US" smtClean="0"/>
               <a:pPr/>
-              <a:t>3/28/2024</a:t>
+              <a:t>3/30/2024</a:t>
             </a:fld>
             <a:endParaRPr lang="en-US"/>
           </a:p>
@@ -1774,7 +1774,7 @@
             <a:fld id="{1D8BD707-D9CF-40AE-B4C6-C98DA3205C09}" type="datetimeFigureOut">
               <a:rPr lang="en-US" smtClean="0"/>
               <a:pPr/>
-              <a:t>3/28/2024</a:t>
+              <a:t>3/30/2024</a:t>
             </a:fld>
             <a:endParaRPr lang="en-US"/>
           </a:p>
@@ -1888,7 +1888,7 @@
             <a:fld id="{1D8BD707-D9CF-40AE-B4C6-C98DA3205C09}" type="datetimeFigureOut">
               <a:rPr lang="en-US" smtClean="0"/>
               <a:pPr/>
-              <a:t>3/28/2024</a:t>
+              <a:t>3/30/2024</a:t>
             </a:fld>
             <a:endParaRPr lang="en-US"/>
           </a:p>
@@ -1980,7 +1980,7 @@
             <a:fld id="{1D8BD707-D9CF-40AE-B4C6-C98DA3205C09}" type="datetimeFigureOut">
               <a:rPr lang="en-US" smtClean="0"/>
               <a:pPr/>
-              <a:t>3/28/2024</a:t>
+              <a:t>3/30/2024</a:t>
             </a:fld>
             <a:endParaRPr lang="en-US"/>
           </a:p>
@@ -2252,7 +2252,7 @@
             <a:fld id="{1D8BD707-D9CF-40AE-B4C6-C98DA3205C09}" type="datetimeFigureOut">
               <a:rPr lang="en-US" smtClean="0"/>
               <a:pPr/>
-              <a:t>3/28/2024</a:t>
+              <a:t>3/30/2024</a:t>
             </a:fld>
             <a:endParaRPr lang="en-US"/>
           </a:p>
@@ -2501,7 +2501,7 @@
             <a:fld id="{1D8BD707-D9CF-40AE-B4C6-C98DA3205C09}" type="datetimeFigureOut">
               <a:rPr lang="en-US" smtClean="0"/>
               <a:pPr/>
-              <a:t>3/28/2024</a:t>
+              <a:t>3/30/2024</a:t>
             </a:fld>
             <a:endParaRPr lang="en-US"/>
           </a:p>
@@ -2709,7 +2709,7 @@
             <a:fld id="{1D8BD707-D9CF-40AE-B4C6-C98DA3205C09}" type="datetimeFigureOut">
               <a:rPr lang="en-US" smtClean="0"/>
               <a:pPr/>
-              <a:t>3/28/2024</a:t>
+              <a:t>3/30/2024</a:t>
             </a:fld>
             <a:endParaRPr lang="en-US"/>
           </a:p>
@@ -6727,98 +6727,6 @@
       </p:sp>
       <p:sp>
         <p:nvSpPr>
-          <p:cNvPr id="3" name="Freeform 3"/>
-          <p:cNvSpPr/>
-          <p:nvPr/>
-        </p:nvSpPr>
-        <p:spPr>
-          <a:xfrm>
-            <a:off x="261772" y="336911"/>
-            <a:ext cx="8882228" cy="4038869"/>
-          </a:xfrm>
-          <a:custGeom>
-            <a:avLst/>
-            <a:gdLst/>
-            <a:ahLst/>
-            <a:cxnLst/>
-            <a:rect l="l" t="t" r="r" b="b"/>
-            <a:pathLst>
-              <a:path w="8882228" h="4038869">
-                <a:moveTo>
-                  <a:pt x="0" y="0"/>
-                </a:moveTo>
-                <a:lnTo>
-                  <a:pt x="8882228" y="0"/>
-                </a:lnTo>
-                <a:lnTo>
-                  <a:pt x="8882228" y="4038870"/>
-                </a:lnTo>
-                <a:lnTo>
-                  <a:pt x="0" y="4038870"/>
-                </a:lnTo>
-                <a:lnTo>
-                  <a:pt x="0" y="0"/>
-                </a:lnTo>
-                <a:close/>
-              </a:path>
-            </a:pathLst>
-          </a:custGeom>
-          <a:blipFill>
-            <a:blip r:embed="rId3"/>
-            <a:stretch>
-              <a:fillRect/>
-            </a:stretch>
-          </a:blipFill>
-        </p:spPr>
-      </p:sp>
-      <p:sp>
-        <p:nvSpPr>
-          <p:cNvPr id="4" name="Freeform 4"/>
-          <p:cNvSpPr/>
-          <p:nvPr/>
-        </p:nvSpPr>
-        <p:spPr>
-          <a:xfrm>
-            <a:off x="10549787" y="4375781"/>
-            <a:ext cx="7147512" cy="5621095"/>
-          </a:xfrm>
-          <a:custGeom>
-            <a:avLst/>
-            <a:gdLst/>
-            <a:ahLst/>
-            <a:cxnLst/>
-            <a:rect l="l" t="t" r="r" b="b"/>
-            <a:pathLst>
-              <a:path w="7147512" h="5621095">
-                <a:moveTo>
-                  <a:pt x="0" y="0"/>
-                </a:moveTo>
-                <a:lnTo>
-                  <a:pt x="7147512" y="0"/>
-                </a:lnTo>
-                <a:lnTo>
-                  <a:pt x="7147512" y="5621094"/>
-                </a:lnTo>
-                <a:lnTo>
-                  <a:pt x="0" y="5621094"/>
-                </a:lnTo>
-                <a:lnTo>
-                  <a:pt x="0" y="0"/>
-                </a:lnTo>
-                <a:close/>
-              </a:path>
-            </a:pathLst>
-          </a:custGeom>
-          <a:blipFill>
-            <a:blip r:embed="rId4"/>
-            <a:stretch>
-              <a:fillRect/>
-            </a:stretch>
-          </a:blipFill>
-        </p:spPr>
-      </p:sp>
-      <p:sp>
-        <p:nvSpPr>
           <p:cNvPr id="5" name="TextBox 5"/>
           <p:cNvSpPr txBox="1"/>
           <p:nvPr/>
@@ -6899,6 +6807,66 @@
           </a:p>
         </p:txBody>
       </p:sp>
+      <p:pic>
+        <p:nvPicPr>
+          <p:cNvPr id="8" name="Рисунок 7">
+            <a:extLst>
+              <a:ext uri="{FF2B5EF4-FFF2-40B4-BE49-F238E27FC236}">
+                <a16:creationId xmlns:a16="http://schemas.microsoft.com/office/drawing/2014/main" id="{F788B3E8-779E-4DFF-93FF-044F330ECFA2}"/>
+              </a:ext>
+            </a:extLst>
+          </p:cNvPr>
+          <p:cNvPicPr>
+            <a:picLocks noChangeAspect="1"/>
+          </p:cNvPicPr>
+          <p:nvPr/>
+        </p:nvPicPr>
+        <p:blipFill>
+          <a:blip r:embed="rId3"/>
+          <a:stretch>
+            <a:fillRect/>
+          </a:stretch>
+        </p:blipFill>
+        <p:spPr>
+          <a:xfrm>
+            <a:off x="371071" y="876300"/>
+            <a:ext cx="9202434" cy="4201111"/>
+          </a:xfrm>
+          <a:prstGeom prst="rect">
+            <a:avLst/>
+          </a:prstGeom>
+        </p:spPr>
+      </p:pic>
+      <p:pic>
+        <p:nvPicPr>
+          <p:cNvPr id="10" name="Рисунок 9">
+            <a:extLst>
+              <a:ext uri="{FF2B5EF4-FFF2-40B4-BE49-F238E27FC236}">
+                <a16:creationId xmlns:a16="http://schemas.microsoft.com/office/drawing/2014/main" id="{052AFAE0-8810-4C44-A139-E6AC37AD6C23}"/>
+              </a:ext>
+            </a:extLst>
+          </p:cNvPr>
+          <p:cNvPicPr>
+            <a:picLocks noChangeAspect="1"/>
+          </p:cNvPicPr>
+          <p:nvPr/>
+        </p:nvPicPr>
+        <p:blipFill>
+          <a:blip r:embed="rId4"/>
+          <a:stretch>
+            <a:fillRect/>
+          </a:stretch>
+        </p:blipFill>
+        <p:spPr>
+          <a:xfrm>
+            <a:off x="10134599" y="4824648"/>
+            <a:ext cx="7370829" cy="5299191"/>
+          </a:xfrm>
+          <a:prstGeom prst="rect">
+            <a:avLst/>
+          </a:prstGeom>
+        </p:spPr>
+      </p:pic>
     </p:spTree>
   </p:cSld>
   <p:clrMapOvr>
@@ -7280,7 +7248,7 @@
         <p:spPr>
           <a:xfrm>
             <a:off x="1333052" y="7845589"/>
-            <a:ext cx="15621893" cy="1061708"/>
+            <a:ext cx="15621893" cy="1012585"/>
           </a:xfrm>
           <a:prstGeom prst="rect">
             <a:avLst/>
@@ -7298,14 +7266,14 @@
               </a:lnSpc>
             </a:pPr>
             <a:r>
-              <a:rPr lang="en-US" sz="6200" u="sng">
+              <a:rPr lang="en-US" sz="6200" u="sng" dirty="0">
                 <a:solidFill>
                   <a:srgbClr val="FFFFFF"/>
                 </a:solidFill>
                 <a:latin typeface="Jura Bold"/>
                 <a:hlinkClick r:id="rId4" tooltip="https://diplom-project-by-ibragim.netlify.app/"/>
               </a:rPr>
-              <a:t>diplom-project-by-ibragim.netlify.app</a:t>
+              <a:t>https://stuff-store.netlify.app</a:t>
             </a:r>
           </a:p>
         </p:txBody>

</xml_diff>